<commit_message>
updated ppt with git repository URL
</commit_message>
<xml_diff>
--- a/KPMG/DataQ/KPMG.pptx
+++ b/KPMG/DataQ/KPMG.pptx
@@ -132,6 +132,7 @@
   <p1510:revLst>
     <p1510:client id="{0E0862BF-CE91-0E5A-C393-ABEACE84FB9D}" v="1031" dt="2020-08-28T01:41:26.371"/>
     <p1510:client id="{203E4C48-0846-749E-D37C-9B60BA9391A0}" v="5524" dt="2020-08-20T18:20:14.194"/>
+    <p1510:client id="{5866422F-D77E-48E3-A883-35A1861B2815}" v="91" dt="2020-08-28T17:47:34.210"/>
     <p1510:client id="{774B3652-6118-EE06-6630-C327C34D1E77}" v="445" dt="2020-08-20T04:40:05.490"/>
     <p1510:client id="{F8348208-6FEF-1C2A-96D5-1B451C17F524}" v="1560" dt="2020-08-25T01:49:11.145"/>
     <p1510:client id="{F911034F-E316-488D-A785-9144CD4B63A7}" v="195" dt="2020-08-20T04:32:00.315"/>
@@ -270,7 +271,7 @@
           <a:p>
             <a:fld id="{F64A8E5F-40E5-4553-9F3C-699F1A5B8145}" type="datetimeFigureOut">
               <a:rPr lang="de-DE" smtClean="0"/>
-              <a:t>27.08.2020</a:t>
+              <a:t>28.08.2020</a:t>
             </a:fld>
             <a:endParaRPr lang="de-DE"/>
           </a:p>
@@ -440,7 +441,7 @@
           <a:p>
             <a:fld id="{F64A8E5F-40E5-4553-9F3C-699F1A5B8145}" type="datetimeFigureOut">
               <a:rPr lang="de-DE" smtClean="0"/>
-              <a:t>27.08.2020</a:t>
+              <a:t>28.08.2020</a:t>
             </a:fld>
             <a:endParaRPr lang="de-DE"/>
           </a:p>
@@ -620,7 +621,7 @@
           <a:p>
             <a:fld id="{F64A8E5F-40E5-4553-9F3C-699F1A5B8145}" type="datetimeFigureOut">
               <a:rPr lang="de-DE" smtClean="0"/>
-              <a:t>27.08.2020</a:t>
+              <a:t>28.08.2020</a:t>
             </a:fld>
             <a:endParaRPr lang="de-DE"/>
           </a:p>
@@ -790,7 +791,7 @@
           <a:p>
             <a:fld id="{F64A8E5F-40E5-4553-9F3C-699F1A5B8145}" type="datetimeFigureOut">
               <a:rPr lang="de-DE" smtClean="0"/>
-              <a:t>27.08.2020</a:t>
+              <a:t>28.08.2020</a:t>
             </a:fld>
             <a:endParaRPr lang="de-DE"/>
           </a:p>
@@ -1036,7 +1037,7 @@
           <a:p>
             <a:fld id="{F64A8E5F-40E5-4553-9F3C-699F1A5B8145}" type="datetimeFigureOut">
               <a:rPr lang="de-DE" smtClean="0"/>
-              <a:t>27.08.2020</a:t>
+              <a:t>28.08.2020</a:t>
             </a:fld>
             <a:endParaRPr lang="de-DE"/>
           </a:p>
@@ -1268,7 +1269,7 @@
           <a:p>
             <a:fld id="{F64A8E5F-40E5-4553-9F3C-699F1A5B8145}" type="datetimeFigureOut">
               <a:rPr lang="de-DE" smtClean="0"/>
-              <a:t>27.08.2020</a:t>
+              <a:t>28.08.2020</a:t>
             </a:fld>
             <a:endParaRPr lang="de-DE"/>
           </a:p>
@@ -1635,7 +1636,7 @@
           <a:p>
             <a:fld id="{F64A8E5F-40E5-4553-9F3C-699F1A5B8145}" type="datetimeFigureOut">
               <a:rPr lang="de-DE" smtClean="0"/>
-              <a:t>27.08.2020</a:t>
+              <a:t>28.08.2020</a:t>
             </a:fld>
             <a:endParaRPr lang="de-DE"/>
           </a:p>
@@ -1753,7 +1754,7 @@
           <a:p>
             <a:fld id="{F64A8E5F-40E5-4553-9F3C-699F1A5B8145}" type="datetimeFigureOut">
               <a:rPr lang="de-DE" smtClean="0"/>
-              <a:t>27.08.2020</a:t>
+              <a:t>28.08.2020</a:t>
             </a:fld>
             <a:endParaRPr lang="de-DE"/>
           </a:p>
@@ -1848,7 +1849,7 @@
           <a:p>
             <a:fld id="{F64A8E5F-40E5-4553-9F3C-699F1A5B8145}" type="datetimeFigureOut">
               <a:rPr lang="de-DE" smtClean="0"/>
-              <a:t>27.08.2020</a:t>
+              <a:t>28.08.2020</a:t>
             </a:fld>
             <a:endParaRPr lang="de-DE"/>
           </a:p>
@@ -2125,7 +2126,7 @@
           <a:p>
             <a:fld id="{F64A8E5F-40E5-4553-9F3C-699F1A5B8145}" type="datetimeFigureOut">
               <a:rPr lang="de-DE" smtClean="0"/>
-              <a:t>27.08.2020</a:t>
+              <a:t>28.08.2020</a:t>
             </a:fld>
             <a:endParaRPr lang="de-DE"/>
           </a:p>
@@ -2378,7 +2379,7 @@
           <a:p>
             <a:fld id="{F64A8E5F-40E5-4553-9F3C-699F1A5B8145}" type="datetimeFigureOut">
               <a:rPr lang="de-DE" smtClean="0"/>
-              <a:t>27.08.2020</a:t>
+              <a:t>28.08.2020</a:t>
             </a:fld>
             <a:endParaRPr lang="de-DE"/>
           </a:p>
@@ -2591,7 +2592,7 @@
           <a:p>
             <a:fld id="{F64A8E5F-40E5-4553-9F3C-699F1A5B8145}" type="datetimeFigureOut">
               <a:rPr lang="de-DE" smtClean="0"/>
-              <a:t>27.08.2020</a:t>
+              <a:t>28.08.2020</a:t>
             </a:fld>
             <a:endParaRPr lang="de-DE"/>
           </a:p>
@@ -6979,6 +6980,86 @@
           </a:prstGeom>
         </p:spPr>
       </p:pic>
+      <p:sp>
+        <p:nvSpPr>
+          <p:cNvPr id="3" name="CasellaDiTesto 2">
+            <a:extLst>
+              <a:ext uri="{FF2B5EF4-FFF2-40B4-BE49-F238E27FC236}">
+                <a16:creationId xmlns:a16="http://schemas.microsoft.com/office/drawing/2014/main" id="{811997AF-B35E-48E3-A269-0827CCD5ADFF}"/>
+              </a:ext>
+            </a:extLst>
+          </p:cNvPr>
+          <p:cNvSpPr txBox="1"/>
+          <p:nvPr/>
+        </p:nvSpPr>
+        <p:spPr>
+          <a:xfrm>
+            <a:off x="6046879" y="5870549"/>
+            <a:ext cx="5728224" cy="646331"/>
+          </a:xfrm>
+          <a:prstGeom prst="rect">
+            <a:avLst/>
+          </a:prstGeom>
+          <a:noFill/>
+        </p:spPr>
+        <p:txBody>
+          <a:bodyPr rot="0" spcFirstLastPara="0" vertOverflow="overflow" horzOverflow="overflow" vert="horz" wrap="square" lIns="91440" tIns="45720" rIns="91440" bIns="45720" numCol="1" spcCol="0" rtlCol="0" fromWordArt="0" anchor="t" anchorCtr="0" forceAA="0" compatLnSpc="1">
+            <a:prstTxWarp prst="textNoShape">
+              <a:avLst/>
+            </a:prstTxWarp>
+            <a:spAutoFit/>
+          </a:bodyPr>
+          <a:lstStyle/>
+          <a:p>
+            <a:r>
+              <a:rPr lang="it-IT"/>
+              <a:t>https://github.com/alexsilza898/InsideSherpa/tree/master/KPMG/DataQ</a:t>
+            </a:r>
+            <a:endParaRPr lang="en-US" i="1"/>
+          </a:p>
+        </p:txBody>
+      </p:sp>
+      <p:sp>
+        <p:nvSpPr>
+          <p:cNvPr id="6" name="CasellaDiTesto 5">
+            <a:extLst>
+              <a:ext uri="{FF2B5EF4-FFF2-40B4-BE49-F238E27FC236}">
+                <a16:creationId xmlns:a16="http://schemas.microsoft.com/office/drawing/2014/main" id="{D51318C3-1EF0-4C5B-8D4D-C484882FCE88}"/>
+              </a:ext>
+            </a:extLst>
+          </p:cNvPr>
+          <p:cNvSpPr txBox="1"/>
+          <p:nvPr/>
+        </p:nvSpPr>
+        <p:spPr>
+          <a:xfrm>
+            <a:off x="6046879" y="5366747"/>
+            <a:ext cx="5186638" cy="369332"/>
+          </a:xfrm>
+          <a:prstGeom prst="rect">
+            <a:avLst/>
+          </a:prstGeom>
+          <a:noFill/>
+        </p:spPr>
+        <p:txBody>
+          <a:bodyPr rot="0" spcFirstLastPara="0" vertOverflow="overflow" horzOverflow="overflow" vert="horz" wrap="square" lIns="91440" tIns="45720" rIns="91440" bIns="45720" numCol="1" spcCol="0" rtlCol="0" fromWordArt="0" anchor="t" anchorCtr="0" forceAA="0" compatLnSpc="1">
+            <a:prstTxWarp prst="textNoShape">
+              <a:avLst/>
+            </a:prstTxWarp>
+            <a:spAutoFit/>
+          </a:bodyPr>
+          <a:lstStyle/>
+          <a:p>
+            <a:r>
+              <a:rPr lang="en-US" dirty="0"/>
+              <a:t>All code can be found at the git repository:</a:t>
+            </a:r>
+            <a:endParaRPr lang="en-US" dirty="0">
+              <a:cs typeface="Calibri"/>
+            </a:endParaRPr>
+          </a:p>
+        </p:txBody>
+      </p:sp>
     </p:spTree>
     <p:extLst>
       <p:ext uri="{BB962C8B-B14F-4D97-AF65-F5344CB8AC3E}">

</xml_diff>